<commit_message>
add a few text
</commit_message>
<xml_diff>
--- a/1.pptx
+++ b/1.pptx
@@ -11,6 +11,15 @@
     <p:sldId id="259" r:id="rId5"/>
     <p:sldId id="260" r:id="rId6"/>
     <p:sldId id="262" r:id="rId7"/>
+    <p:sldId id="263" r:id="rId8"/>
+    <p:sldId id="264" r:id="rId9"/>
+    <p:sldId id="265" r:id="rId10"/>
+    <p:sldId id="266" r:id="rId11"/>
+    <p:sldId id="267" r:id="rId12"/>
+    <p:sldId id="268" r:id="rId13"/>
+    <p:sldId id="269" r:id="rId14"/>
+    <p:sldId id="270" r:id="rId15"/>
+    <p:sldId id="271" r:id="rId16"/>
   </p:sldIdLst>
   <p:sldSz cx="12192000" cy="6858000"/>
   <p:notesSz cx="6858000" cy="9144000"/>
@@ -7672,6 +7681,428 @@
 </p:sld>
 </file>
 
+<file path=ppt/slides/slide10.xml><?xml version="1.0" encoding="utf-8"?>
+<p:sld xmlns:a="http://schemas.openxmlformats.org/drawingml/2006/main" xmlns:r="http://schemas.openxmlformats.org/officeDocument/2006/relationships" xmlns:p="http://schemas.openxmlformats.org/presentationml/2006/main">
+  <p:cSld>
+    <p:spTree>
+      <p:nvGrpSpPr>
+        <p:cNvPr id="1" name=""/>
+        <p:cNvGrpSpPr/>
+        <p:nvPr/>
+      </p:nvGrpSpPr>
+      <p:grpSpPr>
+        <a:xfrm>
+          <a:off x="0" y="0"/>
+          <a:ext cx="0" cy="0"/>
+          <a:chOff x="0" y="0"/>
+          <a:chExt cx="0" cy="0"/>
+        </a:xfrm>
+      </p:grpSpPr>
+      <p:sp>
+        <p:nvSpPr>
+          <p:cNvPr id="2" name="Title 1"/>
+          <p:cNvSpPr>
+            <a:spLocks noGrp="1"/>
+          </p:cNvSpPr>
+          <p:nvPr>
+            <p:ph type="title"/>
+          </p:nvPr>
+        </p:nvSpPr>
+        <p:spPr/>
+        <p:txBody>
+          <a:bodyPr/>
+          <a:lstStyle/>
+          <a:p>
+            <a:r>
+              <a:rPr lang="en-US" dirty="0" smtClean="0"/>
+              <a:t>ER diagram for ETD</a:t>
+            </a:r>
+            <a:endParaRPr lang="en-US" dirty="0"/>
+          </a:p>
+        </p:txBody>
+      </p:sp>
+      <p:sp>
+        <p:nvSpPr>
+          <p:cNvPr id="3" name="Content Placeholder 2"/>
+          <p:cNvSpPr>
+            <a:spLocks noGrp="1"/>
+          </p:cNvSpPr>
+          <p:nvPr>
+            <p:ph idx="1"/>
+          </p:nvPr>
+        </p:nvSpPr>
+        <p:spPr/>
+        <p:txBody>
+          <a:bodyPr/>
+          <a:lstStyle/>
+          <a:p>
+            <a:endParaRPr lang="en-US"/>
+          </a:p>
+        </p:txBody>
+      </p:sp>
+    </p:spTree>
+    <p:extLst>
+      <p:ext uri="{BB962C8B-B14F-4D97-AF65-F5344CB8AC3E}">
+        <p14:creationId xmlns:p14="http://schemas.microsoft.com/office/powerpoint/2010/main" val="1614212040"/>
+      </p:ext>
+    </p:extLst>
+  </p:cSld>
+  <p:clrMapOvr>
+    <a:masterClrMapping/>
+  </p:clrMapOvr>
+</p:sld>
+</file>
+
+<file path=ppt/slides/slide11.xml><?xml version="1.0" encoding="utf-8"?>
+<p:sld xmlns:a="http://schemas.openxmlformats.org/drawingml/2006/main" xmlns:r="http://schemas.openxmlformats.org/officeDocument/2006/relationships" xmlns:p="http://schemas.openxmlformats.org/presentationml/2006/main">
+  <p:cSld>
+    <p:spTree>
+      <p:nvGrpSpPr>
+        <p:cNvPr id="1" name=""/>
+        <p:cNvGrpSpPr/>
+        <p:nvPr/>
+      </p:nvGrpSpPr>
+      <p:grpSpPr>
+        <a:xfrm>
+          <a:off x="0" y="0"/>
+          <a:ext cx="0" cy="0"/>
+          <a:chOff x="0" y="0"/>
+          <a:chExt cx="0" cy="0"/>
+        </a:xfrm>
+      </p:grpSpPr>
+      <p:sp>
+        <p:nvSpPr>
+          <p:cNvPr id="2" name="Title 1"/>
+          <p:cNvSpPr>
+            <a:spLocks noGrp="1"/>
+          </p:cNvSpPr>
+          <p:nvPr>
+            <p:ph type="title"/>
+          </p:nvPr>
+        </p:nvSpPr>
+        <p:spPr/>
+        <p:txBody>
+          <a:bodyPr/>
+          <a:lstStyle/>
+          <a:p>
+            <a:r>
+              <a:rPr lang="en-US" dirty="0" smtClean="0"/>
+              <a:t>Use case Diagram For ETD</a:t>
+            </a:r>
+            <a:endParaRPr lang="en-US" dirty="0"/>
+          </a:p>
+        </p:txBody>
+      </p:sp>
+      <p:sp>
+        <p:nvSpPr>
+          <p:cNvPr id="3" name="Content Placeholder 2"/>
+          <p:cNvSpPr>
+            <a:spLocks noGrp="1"/>
+          </p:cNvSpPr>
+          <p:nvPr>
+            <p:ph idx="1"/>
+          </p:nvPr>
+        </p:nvSpPr>
+        <p:spPr/>
+        <p:txBody>
+          <a:bodyPr/>
+          <a:lstStyle/>
+          <a:p>
+            <a:endParaRPr lang="en-US"/>
+          </a:p>
+        </p:txBody>
+      </p:sp>
+    </p:spTree>
+    <p:extLst>
+      <p:ext uri="{BB962C8B-B14F-4D97-AF65-F5344CB8AC3E}">
+        <p14:creationId xmlns:p14="http://schemas.microsoft.com/office/powerpoint/2010/main" val="2695250412"/>
+      </p:ext>
+    </p:extLst>
+  </p:cSld>
+  <p:clrMapOvr>
+    <a:masterClrMapping/>
+  </p:clrMapOvr>
+</p:sld>
+</file>
+
+<file path=ppt/slides/slide12.xml><?xml version="1.0" encoding="utf-8"?>
+<p:sld xmlns:a="http://schemas.openxmlformats.org/drawingml/2006/main" xmlns:r="http://schemas.openxmlformats.org/officeDocument/2006/relationships" xmlns:p="http://schemas.openxmlformats.org/presentationml/2006/main">
+  <p:cSld>
+    <p:spTree>
+      <p:nvGrpSpPr>
+        <p:cNvPr id="1" name=""/>
+        <p:cNvGrpSpPr/>
+        <p:nvPr/>
+      </p:nvGrpSpPr>
+      <p:grpSpPr>
+        <a:xfrm>
+          <a:off x="0" y="0"/>
+          <a:ext cx="0" cy="0"/>
+          <a:chOff x="0" y="0"/>
+          <a:chExt cx="0" cy="0"/>
+        </a:xfrm>
+      </p:grpSpPr>
+      <p:sp>
+        <p:nvSpPr>
+          <p:cNvPr id="2" name="Title 1"/>
+          <p:cNvSpPr>
+            <a:spLocks noGrp="1"/>
+          </p:cNvSpPr>
+          <p:nvPr>
+            <p:ph type="title"/>
+          </p:nvPr>
+        </p:nvSpPr>
+        <p:spPr/>
+        <p:txBody>
+          <a:bodyPr/>
+          <a:lstStyle/>
+          <a:p>
+            <a:r>
+              <a:rPr lang="en-US" dirty="0" smtClean="0"/>
+              <a:t>Sequence Diagram For ETD</a:t>
+            </a:r>
+            <a:endParaRPr lang="en-US" dirty="0"/>
+          </a:p>
+        </p:txBody>
+      </p:sp>
+      <p:sp>
+        <p:nvSpPr>
+          <p:cNvPr id="3" name="Content Placeholder 2"/>
+          <p:cNvSpPr>
+            <a:spLocks noGrp="1"/>
+          </p:cNvSpPr>
+          <p:nvPr>
+            <p:ph idx="1"/>
+          </p:nvPr>
+        </p:nvSpPr>
+        <p:spPr/>
+        <p:txBody>
+          <a:bodyPr/>
+          <a:lstStyle/>
+          <a:p>
+            <a:endParaRPr lang="en-US"/>
+          </a:p>
+        </p:txBody>
+      </p:sp>
+    </p:spTree>
+    <p:extLst>
+      <p:ext uri="{BB962C8B-B14F-4D97-AF65-F5344CB8AC3E}">
+        <p14:creationId xmlns:p14="http://schemas.microsoft.com/office/powerpoint/2010/main" val="2913215668"/>
+      </p:ext>
+    </p:extLst>
+  </p:cSld>
+  <p:clrMapOvr>
+    <a:masterClrMapping/>
+  </p:clrMapOvr>
+</p:sld>
+</file>
+
+<file path=ppt/slides/slide13.xml><?xml version="1.0" encoding="utf-8"?>
+<p:sld xmlns:a="http://schemas.openxmlformats.org/drawingml/2006/main" xmlns:r="http://schemas.openxmlformats.org/officeDocument/2006/relationships" xmlns:p="http://schemas.openxmlformats.org/presentationml/2006/main">
+  <p:cSld>
+    <p:spTree>
+      <p:nvGrpSpPr>
+        <p:cNvPr id="1" name=""/>
+        <p:cNvGrpSpPr/>
+        <p:nvPr/>
+      </p:nvGrpSpPr>
+      <p:grpSpPr>
+        <a:xfrm>
+          <a:off x="0" y="0"/>
+          <a:ext cx="0" cy="0"/>
+          <a:chOff x="0" y="0"/>
+          <a:chExt cx="0" cy="0"/>
+        </a:xfrm>
+      </p:grpSpPr>
+      <p:sp>
+        <p:nvSpPr>
+          <p:cNvPr id="2" name="Title 1"/>
+          <p:cNvSpPr>
+            <a:spLocks noGrp="1"/>
+          </p:cNvSpPr>
+          <p:nvPr>
+            <p:ph type="title"/>
+          </p:nvPr>
+        </p:nvSpPr>
+        <p:spPr/>
+        <p:txBody>
+          <a:bodyPr/>
+          <a:lstStyle/>
+          <a:p>
+            <a:r>
+              <a:rPr lang="en-US" dirty="0" err="1" smtClean="0"/>
+              <a:t>Minestones</a:t>
+            </a:r>
+            <a:r>
+              <a:rPr lang="en-US" dirty="0" smtClean="0"/>
+              <a:t> and job distribution</a:t>
+            </a:r>
+            <a:endParaRPr lang="en-US" dirty="0"/>
+          </a:p>
+        </p:txBody>
+      </p:sp>
+      <p:sp>
+        <p:nvSpPr>
+          <p:cNvPr id="3" name="Content Placeholder 2"/>
+          <p:cNvSpPr>
+            <a:spLocks noGrp="1"/>
+          </p:cNvSpPr>
+          <p:nvPr>
+            <p:ph idx="1"/>
+          </p:nvPr>
+        </p:nvSpPr>
+        <p:spPr/>
+        <p:txBody>
+          <a:bodyPr/>
+          <a:lstStyle/>
+          <a:p>
+            <a:endParaRPr lang="en-US"/>
+          </a:p>
+        </p:txBody>
+      </p:sp>
+    </p:spTree>
+    <p:extLst>
+      <p:ext uri="{BB962C8B-B14F-4D97-AF65-F5344CB8AC3E}">
+        <p14:creationId xmlns:p14="http://schemas.microsoft.com/office/powerpoint/2010/main" val="3967389016"/>
+      </p:ext>
+    </p:extLst>
+  </p:cSld>
+  <p:clrMapOvr>
+    <a:masterClrMapping/>
+  </p:clrMapOvr>
+</p:sld>
+</file>
+
+<file path=ppt/slides/slide14.xml><?xml version="1.0" encoding="utf-8"?>
+<p:sld xmlns:a="http://schemas.openxmlformats.org/drawingml/2006/main" xmlns:r="http://schemas.openxmlformats.org/officeDocument/2006/relationships" xmlns:p="http://schemas.openxmlformats.org/presentationml/2006/main">
+  <p:cSld>
+    <p:spTree>
+      <p:nvGrpSpPr>
+        <p:cNvPr id="1" name=""/>
+        <p:cNvGrpSpPr/>
+        <p:nvPr/>
+      </p:nvGrpSpPr>
+      <p:grpSpPr>
+        <a:xfrm>
+          <a:off x="0" y="0"/>
+          <a:ext cx="0" cy="0"/>
+          <a:chOff x="0" y="0"/>
+          <a:chExt cx="0" cy="0"/>
+        </a:xfrm>
+      </p:grpSpPr>
+      <p:sp>
+        <p:nvSpPr>
+          <p:cNvPr id="2" name="Title 1"/>
+          <p:cNvSpPr>
+            <a:spLocks noGrp="1"/>
+          </p:cNvSpPr>
+          <p:nvPr>
+            <p:ph type="title"/>
+          </p:nvPr>
+        </p:nvSpPr>
+        <p:spPr/>
+        <p:txBody>
+          <a:bodyPr/>
+          <a:lstStyle/>
+          <a:p>
+            <a:r>
+              <a:rPr lang="en-US" dirty="0" smtClean="0"/>
+              <a:t>Conclusion</a:t>
+            </a:r>
+            <a:endParaRPr lang="en-US" dirty="0"/>
+          </a:p>
+        </p:txBody>
+      </p:sp>
+      <p:sp>
+        <p:nvSpPr>
+          <p:cNvPr id="3" name="Content Placeholder 2"/>
+          <p:cNvSpPr>
+            <a:spLocks noGrp="1"/>
+          </p:cNvSpPr>
+          <p:nvPr>
+            <p:ph idx="1"/>
+          </p:nvPr>
+        </p:nvSpPr>
+        <p:spPr/>
+        <p:txBody>
+          <a:bodyPr/>
+          <a:lstStyle/>
+          <a:p>
+            <a:endParaRPr lang="en-US"/>
+          </a:p>
+        </p:txBody>
+      </p:sp>
+    </p:spTree>
+    <p:extLst>
+      <p:ext uri="{BB962C8B-B14F-4D97-AF65-F5344CB8AC3E}">
+        <p14:creationId xmlns:p14="http://schemas.microsoft.com/office/powerpoint/2010/main" val="1796529889"/>
+      </p:ext>
+    </p:extLst>
+  </p:cSld>
+  <p:clrMapOvr>
+    <a:masterClrMapping/>
+  </p:clrMapOvr>
+</p:sld>
+</file>
+
+<file path=ppt/slides/slide15.xml><?xml version="1.0" encoding="utf-8"?>
+<p:sld xmlns:a="http://schemas.openxmlformats.org/drawingml/2006/main" xmlns:r="http://schemas.openxmlformats.org/officeDocument/2006/relationships" xmlns:p="http://schemas.openxmlformats.org/presentationml/2006/main">
+  <p:cSld>
+    <p:spTree>
+      <p:nvGrpSpPr>
+        <p:cNvPr id="1" name=""/>
+        <p:cNvGrpSpPr/>
+        <p:nvPr/>
+      </p:nvGrpSpPr>
+      <p:grpSpPr>
+        <a:xfrm>
+          <a:off x="0" y="0"/>
+          <a:ext cx="0" cy="0"/>
+          <a:chOff x="0" y="0"/>
+          <a:chExt cx="0" cy="0"/>
+        </a:xfrm>
+      </p:grpSpPr>
+      <p:sp>
+        <p:nvSpPr>
+          <p:cNvPr id="2" name="Title 1"/>
+          <p:cNvSpPr>
+            <a:spLocks noGrp="1"/>
+          </p:cNvSpPr>
+          <p:nvPr>
+            <p:ph type="title"/>
+          </p:nvPr>
+        </p:nvSpPr>
+        <p:spPr>
+          <a:xfrm>
+            <a:off x="3217333" y="2768998"/>
+            <a:ext cx="8772701" cy="843446"/>
+          </a:xfrm>
+        </p:spPr>
+        <p:txBody>
+          <a:bodyPr/>
+          <a:lstStyle/>
+          <a:p>
+            <a:r>
+              <a:rPr lang="en-US" dirty="0" smtClean="0"/>
+              <a:t>Thanks For Your Attention!</a:t>
+            </a:r>
+            <a:endParaRPr lang="en-US" dirty="0"/>
+          </a:p>
+        </p:txBody>
+      </p:sp>
+    </p:spTree>
+    <p:extLst>
+      <p:ext uri="{BB962C8B-B14F-4D97-AF65-F5344CB8AC3E}">
+        <p14:creationId xmlns:p14="http://schemas.microsoft.com/office/powerpoint/2010/main" val="317149102"/>
+      </p:ext>
+    </p:extLst>
+  </p:cSld>
+  <p:clrMapOvr>
+    <a:masterClrMapping/>
+  </p:clrMapOvr>
+</p:sld>
+</file>
+
 <file path=ppt/slides/slide2.xml><?xml version="1.0" encoding="utf-8"?>
 <p:sld xmlns:a="http://schemas.openxmlformats.org/drawingml/2006/main" xmlns:r="http://schemas.openxmlformats.org/officeDocument/2006/relationships" xmlns:p="http://schemas.openxmlformats.org/presentationml/2006/main">
   <p:cSld>
@@ -8435,15 +8866,7 @@
           <a:p>
             <a:r>
               <a:rPr lang="en-US" dirty="0" smtClean="0"/>
-              <a:t>For Admin Panel , admins </a:t>
-            </a:r>
-            <a:r>
-              <a:rPr lang="en-US" dirty="0" smtClean="0"/>
-              <a:t>can </a:t>
-            </a:r>
-            <a:r>
-              <a:rPr lang="en-US" dirty="0" smtClean="0"/>
-              <a:t>insert  data into database , delete data and retrieve data for database.</a:t>
+              <a:t>For Admin Panel , admins can insert  data into database , delete data and retrieve data for database.</a:t>
             </a:r>
           </a:p>
           <a:p>
@@ -8492,6 +8915,250 @@
     <p:extLst>
       <p:ext uri="{BB962C8B-B14F-4D97-AF65-F5344CB8AC3E}">
         <p14:creationId xmlns:p14="http://schemas.microsoft.com/office/powerpoint/2010/main" val="528883258"/>
+      </p:ext>
+    </p:extLst>
+  </p:cSld>
+  <p:clrMapOvr>
+    <a:masterClrMapping/>
+  </p:clrMapOvr>
+</p:sld>
+</file>
+
+<file path=ppt/slides/slide7.xml><?xml version="1.0" encoding="utf-8"?>
+<p:sld xmlns:a="http://schemas.openxmlformats.org/drawingml/2006/main" xmlns:r="http://schemas.openxmlformats.org/officeDocument/2006/relationships" xmlns:p="http://schemas.openxmlformats.org/presentationml/2006/main">
+  <p:cSld>
+    <p:spTree>
+      <p:nvGrpSpPr>
+        <p:cNvPr id="1" name=""/>
+        <p:cNvGrpSpPr/>
+        <p:nvPr/>
+      </p:nvGrpSpPr>
+      <p:grpSpPr>
+        <a:xfrm>
+          <a:off x="0" y="0"/>
+          <a:ext cx="0" cy="0"/>
+          <a:chOff x="0" y="0"/>
+          <a:chExt cx="0" cy="0"/>
+        </a:xfrm>
+      </p:grpSpPr>
+      <p:sp>
+        <p:nvSpPr>
+          <p:cNvPr id="2" name="Title 1"/>
+          <p:cNvSpPr>
+            <a:spLocks noGrp="1"/>
+          </p:cNvSpPr>
+          <p:nvPr>
+            <p:ph type="title"/>
+          </p:nvPr>
+        </p:nvSpPr>
+        <p:spPr/>
+        <p:txBody>
+          <a:bodyPr/>
+          <a:lstStyle/>
+          <a:p>
+            <a:r>
+              <a:rPr lang="en-US" dirty="0" smtClean="0"/>
+              <a:t>Requirement Analysis</a:t>
+            </a:r>
+            <a:endParaRPr lang="en-US" dirty="0"/>
+          </a:p>
+        </p:txBody>
+      </p:sp>
+      <p:sp>
+        <p:nvSpPr>
+          <p:cNvPr id="3" name="Content Placeholder 2"/>
+          <p:cNvSpPr>
+            <a:spLocks noGrp="1"/>
+          </p:cNvSpPr>
+          <p:nvPr>
+            <p:ph idx="1"/>
+          </p:nvPr>
+        </p:nvSpPr>
+        <p:spPr/>
+        <p:txBody>
+          <a:bodyPr/>
+          <a:lstStyle/>
+          <a:p>
+            <a:r>
+              <a:rPr lang="en-US" dirty="0" smtClean="0"/>
+              <a:t>We get all information of data we use in this project from library of computer university </a:t>
+            </a:r>
+            <a:r>
+              <a:rPr lang="en-US" dirty="0" err="1" smtClean="0"/>
+              <a:t>mandalay</a:t>
+            </a:r>
+            <a:r>
+              <a:rPr lang="en-US" dirty="0" smtClean="0"/>
+              <a:t>.</a:t>
+            </a:r>
+            <a:endParaRPr lang="en-US" dirty="0"/>
+          </a:p>
+        </p:txBody>
+      </p:sp>
+    </p:spTree>
+    <p:extLst>
+      <p:ext uri="{BB962C8B-B14F-4D97-AF65-F5344CB8AC3E}">
+        <p14:creationId xmlns:p14="http://schemas.microsoft.com/office/powerpoint/2010/main" val="2620374173"/>
+      </p:ext>
+    </p:extLst>
+  </p:cSld>
+  <p:clrMapOvr>
+    <a:masterClrMapping/>
+  </p:clrMapOvr>
+</p:sld>
+</file>
+
+<file path=ppt/slides/slide8.xml><?xml version="1.0" encoding="utf-8"?>
+<p:sld xmlns:a="http://schemas.openxmlformats.org/drawingml/2006/main" xmlns:r="http://schemas.openxmlformats.org/officeDocument/2006/relationships" xmlns:p="http://schemas.openxmlformats.org/presentationml/2006/main">
+  <p:cSld>
+    <p:spTree>
+      <p:nvGrpSpPr>
+        <p:cNvPr id="1" name=""/>
+        <p:cNvGrpSpPr/>
+        <p:nvPr/>
+      </p:nvGrpSpPr>
+      <p:grpSpPr>
+        <a:xfrm>
+          <a:off x="0" y="0"/>
+          <a:ext cx="0" cy="0"/>
+          <a:chOff x="0" y="0"/>
+          <a:chExt cx="0" cy="0"/>
+        </a:xfrm>
+      </p:grpSpPr>
+      <p:sp>
+        <p:nvSpPr>
+          <p:cNvPr id="2" name="Title 1"/>
+          <p:cNvSpPr>
+            <a:spLocks noGrp="1"/>
+          </p:cNvSpPr>
+          <p:nvPr>
+            <p:ph type="title"/>
+          </p:nvPr>
+        </p:nvSpPr>
+        <p:spPr/>
+        <p:txBody>
+          <a:bodyPr/>
+          <a:lstStyle/>
+          <a:p>
+            <a:r>
+              <a:rPr lang="en-US" dirty="0" smtClean="0"/>
+              <a:t>Background</a:t>
+            </a:r>
+            <a:endParaRPr lang="en-US" dirty="0"/>
+          </a:p>
+        </p:txBody>
+      </p:sp>
+      <p:sp>
+        <p:nvSpPr>
+          <p:cNvPr id="3" name="Content Placeholder 2"/>
+          <p:cNvSpPr>
+            <a:spLocks noGrp="1"/>
+          </p:cNvSpPr>
+          <p:nvPr>
+            <p:ph idx="1"/>
+          </p:nvPr>
+        </p:nvSpPr>
+        <p:spPr/>
+        <p:txBody>
+          <a:bodyPr/>
+          <a:lstStyle/>
+          <a:p>
+            <a:r>
+              <a:rPr lang="en-US" dirty="0" smtClean="0"/>
+              <a:t>Our Software Company has received</a:t>
+            </a:r>
+          </a:p>
+          <a:p>
+            <a:r>
+              <a:rPr lang="en-US" dirty="0" smtClean="0"/>
+              <a:t>Moreover , we want to know the profit and loss of our system.</a:t>
+            </a:r>
+          </a:p>
+          <a:p>
+            <a:r>
+              <a:rPr lang="en-US" dirty="0" smtClean="0"/>
+              <a:t>So there are many processes to develop manual system and it may be more cost ant time waste . So we decide to develop our system to reduce the problem.</a:t>
+            </a:r>
+            <a:endParaRPr lang="en-US" dirty="0"/>
+          </a:p>
+        </p:txBody>
+      </p:sp>
+    </p:spTree>
+    <p:extLst>
+      <p:ext uri="{BB962C8B-B14F-4D97-AF65-F5344CB8AC3E}">
+        <p14:creationId xmlns:p14="http://schemas.microsoft.com/office/powerpoint/2010/main" val="2345461699"/>
+      </p:ext>
+    </p:extLst>
+  </p:cSld>
+  <p:clrMapOvr>
+    <a:masterClrMapping/>
+  </p:clrMapOvr>
+</p:sld>
+</file>
+
+<file path=ppt/slides/slide9.xml><?xml version="1.0" encoding="utf-8"?>
+<p:sld xmlns:a="http://schemas.openxmlformats.org/drawingml/2006/main" xmlns:r="http://schemas.openxmlformats.org/officeDocument/2006/relationships" xmlns:p="http://schemas.openxmlformats.org/presentationml/2006/main">
+  <p:cSld>
+    <p:spTree>
+      <p:nvGrpSpPr>
+        <p:cNvPr id="1" name=""/>
+        <p:cNvGrpSpPr/>
+        <p:nvPr/>
+      </p:nvGrpSpPr>
+      <p:grpSpPr>
+        <a:xfrm>
+          <a:off x="0" y="0"/>
+          <a:ext cx="0" cy="0"/>
+          <a:chOff x="0" y="0"/>
+          <a:chExt cx="0" cy="0"/>
+        </a:xfrm>
+      </p:grpSpPr>
+      <p:sp>
+        <p:nvSpPr>
+          <p:cNvPr id="2" name="Title 1"/>
+          <p:cNvSpPr>
+            <a:spLocks noGrp="1"/>
+          </p:cNvSpPr>
+          <p:nvPr>
+            <p:ph type="title"/>
+          </p:nvPr>
+        </p:nvSpPr>
+        <p:spPr/>
+        <p:txBody>
+          <a:bodyPr/>
+          <a:lstStyle/>
+          <a:p>
+            <a:r>
+              <a:rPr lang="en-US" dirty="0" smtClean="0"/>
+              <a:t>Flowchart Diagram For ETD</a:t>
+            </a:r>
+            <a:endParaRPr lang="en-US" dirty="0"/>
+          </a:p>
+        </p:txBody>
+      </p:sp>
+      <p:sp>
+        <p:nvSpPr>
+          <p:cNvPr id="3" name="Content Placeholder 2"/>
+          <p:cNvSpPr>
+            <a:spLocks noGrp="1"/>
+          </p:cNvSpPr>
+          <p:nvPr>
+            <p:ph idx="1"/>
+          </p:nvPr>
+        </p:nvSpPr>
+        <p:spPr/>
+        <p:txBody>
+          <a:bodyPr/>
+          <a:lstStyle/>
+          <a:p>
+            <a:endParaRPr lang="en-US"/>
+          </a:p>
+        </p:txBody>
+      </p:sp>
+    </p:spTree>
+    <p:extLst>
+      <p:ext uri="{BB962C8B-B14F-4D97-AF65-F5344CB8AC3E}">
+        <p14:creationId xmlns:p14="http://schemas.microsoft.com/office/powerpoint/2010/main" val="1177767577"/>
       </p:ext>
     </p:extLst>
   </p:cSld>

</xml_diff>